<commit_message>
added time stamp in ps02 C fixed typo in ps02.html, tweaked L2.2
</commit_message>
<xml_diff>
--- a/Slides/Lesson 2.2 Design Strategies.pptx
+++ b/Slides/Lesson 2.2 Design Strategies.pptx
@@ -3910,7 +3910,7 @@
           <a:p>
             <a:fld id="{0FAC78B3-EDCE-4187-A1AE-28620314FA32}" type="datetimeFigureOut">
               <a:rPr lang="en-US" smtClean="0"/>
-              <a:t>7/26/2017</a:t>
+              <a:t>9/19/2017</a:t>
             </a:fld>
             <a:endParaRPr lang="en-US" dirty="0"/>
           </a:p>
@@ -4527,7 +4527,7 @@
           <a:p>
             <a:fld id="{CA8B1E08-976E-451D-97C5-3D69BA983FFE}" type="datetime1">
               <a:rPr lang="en-US" smtClean="0"/>
-              <a:t>7/26/2017</a:t>
+              <a:t>9/19/2017</a:t>
             </a:fld>
             <a:endParaRPr lang="en-US" dirty="0"/>
           </a:p>
@@ -4775,7 +4775,7 @@
           <a:p>
             <a:fld id="{F33D5BC8-75F3-411B-AA7E-18F2517CF048}" type="datetime1">
               <a:rPr lang="en-US" smtClean="0"/>
-              <a:t>7/26/2017</a:t>
+              <a:t>9/19/2017</a:t>
             </a:fld>
             <a:endParaRPr lang="en-US" dirty="0"/>
           </a:p>
@@ -4939,7 +4939,7 @@
           <a:p>
             <a:fld id="{394448D4-AED6-43DB-A0F8-CD4938D2549C}" type="datetime1">
               <a:rPr lang="en-US" smtClean="0"/>
-              <a:t>7/26/2017</a:t>
+              <a:t>9/19/2017</a:t>
             </a:fld>
             <a:endParaRPr lang="en-US" dirty="0"/>
           </a:p>
@@ -5234,7 +5234,7 @@
           <a:p>
             <a:fld id="{5D1846AD-9252-4647-9435-4C2AC365653A}" type="datetime1">
               <a:rPr lang="en-US" smtClean="0"/>
-              <a:t>7/26/2017</a:t>
+              <a:t>9/19/2017</a:t>
             </a:fld>
             <a:endParaRPr lang="en-US"/>
           </a:p>
@@ -5412,7 +5412,7 @@
           <a:p>
             <a:fld id="{160CE893-3A38-428F-89AB-E97AD9CAA95E}" type="datetime1">
               <a:rPr lang="en-US" smtClean="0"/>
-              <a:t>7/26/2017</a:t>
+              <a:t>9/19/2017</a:t>
             </a:fld>
             <a:endParaRPr lang="en-US" dirty="0"/>
           </a:p>
@@ -5667,7 +5667,7 @@
                 </a:solidFill>
               </a:rPr>
               <a:pPr/>
-              <a:t>7/26/2017</a:t>
+              <a:t>9/19/2017</a:t>
             </a:fld>
             <a:endParaRPr lang="en-US">
               <a:solidFill>
@@ -5873,7 +5873,7 @@
                 </a:solidFill>
               </a:rPr>
               <a:pPr/>
-              <a:t>7/26/2017</a:t>
+              <a:t>9/19/2017</a:t>
             </a:fld>
             <a:endParaRPr lang="en-US">
               <a:solidFill>
@@ -6078,7 +6078,7 @@
                 </a:solidFill>
               </a:rPr>
               <a:pPr/>
-              <a:t>7/26/2017</a:t>
+              <a:t>9/19/2017</a:t>
             </a:fld>
             <a:endParaRPr lang="en-US">
               <a:solidFill>
@@ -6375,7 +6375,7 @@
                 </a:solidFill>
               </a:rPr>
               <a:pPr/>
-              <a:t>7/26/2017</a:t>
+              <a:t>9/19/2017</a:t>
             </a:fld>
             <a:endParaRPr lang="en-US">
               <a:solidFill>
@@ -6583,7 +6583,7 @@
                 </a:solidFill>
               </a:rPr>
               <a:pPr/>
-              <a:t>7/26/2017</a:t>
+              <a:t>9/19/2017</a:t>
             </a:fld>
             <a:endParaRPr lang="en-US">
               <a:solidFill>
@@ -6909,7 +6909,7 @@
                 </a:solidFill>
               </a:rPr>
               <a:pPr/>
-              <a:t>7/26/2017</a:t>
+              <a:t>9/19/2017</a:t>
             </a:fld>
             <a:endParaRPr lang="en-US">
               <a:solidFill>
@@ -7114,7 +7114,7 @@
           <a:p>
             <a:fld id="{DC7A6930-E356-4864-92C1-40AC7A5201AA}" type="datetime1">
               <a:rPr lang="en-US" smtClean="0"/>
-              <a:t>7/26/2017</a:t>
+              <a:t>9/19/2017</a:t>
             </a:fld>
             <a:endParaRPr lang="en-US" dirty="0"/>
           </a:p>
@@ -7402,7 +7402,7 @@
                 </a:solidFill>
               </a:rPr>
               <a:pPr/>
-              <a:t>7/26/2017</a:t>
+              <a:t>9/19/2017</a:t>
             </a:fld>
             <a:endParaRPr lang="en-US">
               <a:solidFill>
@@ -7853,7 +7853,7 @@
                 </a:solidFill>
               </a:rPr>
               <a:pPr/>
-              <a:t>7/26/2017</a:t>
+              <a:t>9/19/2017</a:t>
             </a:fld>
             <a:endParaRPr lang="en-US">
               <a:solidFill>
@@ -8002,7 +8002,7 @@
                 </a:solidFill>
               </a:rPr>
               <a:pPr/>
-              <a:t>7/26/2017</a:t>
+              <a:t>9/19/2017</a:t>
             </a:fld>
             <a:endParaRPr lang="en-US">
               <a:solidFill>
@@ -8129,7 +8129,7 @@
                 </a:solidFill>
               </a:rPr>
               <a:pPr/>
-              <a:t>7/26/2017</a:t>
+              <a:t>9/19/2017</a:t>
             </a:fld>
             <a:endParaRPr lang="en-US">
               <a:solidFill>
@@ -8436,7 +8436,7 @@
                 </a:solidFill>
               </a:rPr>
               <a:pPr/>
-              <a:t>7/26/2017</a:t>
+              <a:t>9/19/2017</a:t>
             </a:fld>
             <a:endParaRPr lang="en-US">
               <a:solidFill>
@@ -8720,7 +8720,7 @@
                 </a:solidFill>
               </a:rPr>
               <a:pPr/>
-              <a:t>7/26/2017</a:t>
+              <a:t>9/19/2017</a:t>
             </a:fld>
             <a:endParaRPr lang="en-US">
               <a:solidFill>
@@ -8920,7 +8920,7 @@
                 </a:solidFill>
               </a:rPr>
               <a:pPr/>
-              <a:t>7/26/2017</a:t>
+              <a:t>9/19/2017</a:t>
             </a:fld>
             <a:endParaRPr lang="en-US">
               <a:solidFill>
@@ -9130,7 +9130,7 @@
                 </a:solidFill>
               </a:rPr>
               <a:pPr/>
-              <a:t>7/26/2017</a:t>
+              <a:t>9/19/2017</a:t>
             </a:fld>
             <a:endParaRPr lang="en-US">
               <a:solidFill>
@@ -9334,7 +9334,7 @@
           <a:p>
             <a:fld id="{45C1EE53-8F27-4821-8161-190499C0D007}" type="datetime1">
               <a:rPr lang="en-US" smtClean="0"/>
-              <a:t>7/26/2017</a:t>
+              <a:t>9/19/2017</a:t>
             </a:fld>
             <a:endParaRPr lang="en-US" dirty="0"/>
           </a:p>
@@ -9579,7 +9579,7 @@
           <a:p>
             <a:fld id="{0D423975-99FA-4807-B1B4-A59DEFED898A}" type="datetime1">
               <a:rPr lang="en-US" smtClean="0"/>
-              <a:t>7/26/2017</a:t>
+              <a:t>9/19/2017</a:t>
             </a:fld>
             <a:endParaRPr lang="en-US" dirty="0"/>
           </a:p>
@@ -9860,7 +9860,7 @@
           <a:p>
             <a:fld id="{90F7752F-4922-4BAA-9C20-D4DAF4ED08B5}" type="datetime1">
               <a:rPr lang="en-US" smtClean="0"/>
-              <a:t>7/26/2017</a:t>
+              <a:t>9/19/2017</a:t>
             </a:fld>
             <a:endParaRPr lang="en-US" dirty="0"/>
           </a:p>
@@ -10275,7 +10275,7 @@
           <a:p>
             <a:fld id="{3536A633-E76F-4E07-A3AE-A7A784889AE2}" type="datetime1">
               <a:rPr lang="en-US" smtClean="0"/>
-              <a:t>7/26/2017</a:t>
+              <a:t>9/19/2017</a:t>
             </a:fld>
             <a:endParaRPr lang="en-US" dirty="0"/>
           </a:p>
@@ -10388,7 +10388,7 @@
           <a:p>
             <a:fld id="{61CB5BDE-D72B-4A3A-925B-2A5C22F639AF}" type="datetime1">
               <a:rPr lang="en-US" smtClean="0"/>
-              <a:t>7/26/2017</a:t>
+              <a:t>9/19/2017</a:t>
             </a:fld>
             <a:endParaRPr lang="en-US" dirty="0"/>
           </a:p>
@@ -10479,7 +10479,7 @@
           <a:p>
             <a:fld id="{A24C7B69-131B-4374-A9CC-0845A85B9B89}" type="datetime1">
               <a:rPr lang="en-US" smtClean="0"/>
-              <a:t>7/26/2017</a:t>
+              <a:t>9/19/2017</a:t>
             </a:fld>
             <a:endParaRPr lang="en-US" dirty="0"/>
           </a:p>
@@ -10750,7 +10750,7 @@
           <a:p>
             <a:fld id="{2F57E60E-10B6-4F85-8F8E-D3A8141030E0}" type="datetime1">
               <a:rPr lang="en-US" smtClean="0"/>
-              <a:t>7/26/2017</a:t>
+              <a:t>9/19/2017</a:t>
             </a:fld>
             <a:endParaRPr lang="en-US" dirty="0"/>
           </a:p>
@@ -10969,7 +10969,7 @@
           <a:p>
             <a:fld id="{8684A8BA-DEEC-47D2-87F9-8204232D7DB8}" type="datetime1">
               <a:rPr lang="en-US" smtClean="0"/>
-              <a:t>7/26/2017</a:t>
+              <a:t>9/19/2017</a:t>
             </a:fld>
             <a:endParaRPr lang="en-US" dirty="0"/>
           </a:p>
@@ -11483,7 +11483,7 @@
                 </a:solidFill>
               </a:rPr>
               <a:pPr/>
-              <a:t>7/26/2017</a:t>
+              <a:t>9/19/2017</a:t>
             </a:fld>
             <a:endParaRPr lang="en-US">
               <a:solidFill>
@@ -13007,7 +13007,15 @@
           <a:p>
             <a:r>
               <a:rPr lang="en-US" sz="1200" dirty="0"/>
-              <a:t>(define-struct list (color time-left))</a:t>
+              <a:t>(</a:t>
+            </a:r>
+            <a:r>
+              <a:rPr lang="en-US" sz="1200"/>
+              <a:t>define-struct light </a:t>
+            </a:r>
+            <a:r>
+              <a:rPr lang="en-US" sz="1200" dirty="0"/>
+              <a:t>(color time-left))</a:t>
             </a:r>
           </a:p>
           <a:p>
@@ -15703,7 +15711,7 @@
             <a:pPr lvl="1"/>
             <a:r>
               <a:rPr lang="en-US" dirty="0"/>
-              <a:t>Use Template</a:t>
+              <a:t>Use Observer Template</a:t>
             </a:r>
           </a:p>
           <a:p>
@@ -16139,7 +16147,7 @@
           <a:p>
             <a:r>
               <a:rPr lang="en-US" dirty="0"/>
-              <a:t>Purpose statement describes how the result depends on the argument.</a:t>
+              <a:t>The purpose statement describes how the result depends on the argument.</a:t>
             </a:r>
           </a:p>
           <a:p>

</xml_diff>